<commit_message>
Finální podoba druhé prezentace
</commit_message>
<xml_diff>
--- a/presentations/2_prezentace.pptx
+++ b/presentations/2_prezentace.pptx
@@ -110,7 +110,7 @@
   </p:defaultTextStyle>
   <p:extLst>
     <p:ext uri="{EFAFB233-063F-42B5-8137-9DF3F51BA10A}">
-      <p15:sldGuideLst xmlns:p15="http://schemas.microsoft.com/office/powerpoint/2012/main" xmlns="">
+      <p15:sldGuideLst xmlns="" xmlns:p15="http://schemas.microsoft.com/office/powerpoint/2012/main">
         <p15:guide id="1" orient="horz" pos="2160">
           <p15:clr>
             <a:srgbClr val="A4A3A4"/>
@@ -309,7 +309,7 @@
             <a:fld id="{8D149779-8706-44AB-BA40-0147129EF614}" type="datetimeFigureOut">
               <a:rPr lang="cs-CZ" smtClean="0"/>
               <a:pPr/>
-              <a:t>16.12.2018</a:t>
+              <a:t>17.12.2018</a:t>
             </a:fld>
             <a:endParaRPr lang="cs-CZ"/>
           </a:p>
@@ -476,7 +476,7 @@
             <a:fld id="{8D149779-8706-44AB-BA40-0147129EF614}" type="datetimeFigureOut">
               <a:rPr lang="cs-CZ" smtClean="0"/>
               <a:pPr/>
-              <a:t>16.12.2018</a:t>
+              <a:t>17.12.2018</a:t>
             </a:fld>
             <a:endParaRPr lang="cs-CZ"/>
           </a:p>
@@ -653,7 +653,7 @@
             <a:fld id="{8D149779-8706-44AB-BA40-0147129EF614}" type="datetimeFigureOut">
               <a:rPr lang="cs-CZ" smtClean="0"/>
               <a:pPr/>
-              <a:t>16.12.2018</a:t>
+              <a:t>17.12.2018</a:t>
             </a:fld>
             <a:endParaRPr lang="cs-CZ"/>
           </a:p>
@@ -820,7 +820,7 @@
             <a:fld id="{8D149779-8706-44AB-BA40-0147129EF614}" type="datetimeFigureOut">
               <a:rPr lang="cs-CZ" smtClean="0"/>
               <a:pPr/>
-              <a:t>16.12.2018</a:t>
+              <a:t>17.12.2018</a:t>
             </a:fld>
             <a:endParaRPr lang="cs-CZ"/>
           </a:p>
@@ -1063,7 +1063,7 @@
             <a:fld id="{8D149779-8706-44AB-BA40-0147129EF614}" type="datetimeFigureOut">
               <a:rPr lang="cs-CZ" smtClean="0"/>
               <a:pPr/>
-              <a:t>16.12.2018</a:t>
+              <a:t>17.12.2018</a:t>
             </a:fld>
             <a:endParaRPr lang="cs-CZ"/>
           </a:p>
@@ -1348,7 +1348,7 @@
             <a:fld id="{8D149779-8706-44AB-BA40-0147129EF614}" type="datetimeFigureOut">
               <a:rPr lang="cs-CZ" smtClean="0"/>
               <a:pPr/>
-              <a:t>16.12.2018</a:t>
+              <a:t>17.12.2018</a:t>
             </a:fld>
             <a:endParaRPr lang="cs-CZ"/>
           </a:p>
@@ -1767,7 +1767,7 @@
             <a:fld id="{8D149779-8706-44AB-BA40-0147129EF614}" type="datetimeFigureOut">
               <a:rPr lang="cs-CZ" smtClean="0"/>
               <a:pPr/>
-              <a:t>16.12.2018</a:t>
+              <a:t>17.12.2018</a:t>
             </a:fld>
             <a:endParaRPr lang="cs-CZ"/>
           </a:p>
@@ -1882,7 +1882,7 @@
             <a:fld id="{8D149779-8706-44AB-BA40-0147129EF614}" type="datetimeFigureOut">
               <a:rPr lang="cs-CZ" smtClean="0"/>
               <a:pPr/>
-              <a:t>16.12.2018</a:t>
+              <a:t>17.12.2018</a:t>
             </a:fld>
             <a:endParaRPr lang="cs-CZ"/>
           </a:p>
@@ -1974,7 +1974,7 @@
             <a:fld id="{8D149779-8706-44AB-BA40-0147129EF614}" type="datetimeFigureOut">
               <a:rPr lang="cs-CZ" smtClean="0"/>
               <a:pPr/>
-              <a:t>16.12.2018</a:t>
+              <a:t>17.12.2018</a:t>
             </a:fld>
             <a:endParaRPr lang="cs-CZ"/>
           </a:p>
@@ -2248,7 +2248,7 @@
             <a:fld id="{8D149779-8706-44AB-BA40-0147129EF614}" type="datetimeFigureOut">
               <a:rPr lang="cs-CZ" smtClean="0"/>
               <a:pPr/>
-              <a:t>16.12.2018</a:t>
+              <a:t>17.12.2018</a:t>
             </a:fld>
             <a:endParaRPr lang="cs-CZ"/>
           </a:p>
@@ -2498,7 +2498,7 @@
             <a:fld id="{8D149779-8706-44AB-BA40-0147129EF614}" type="datetimeFigureOut">
               <a:rPr lang="cs-CZ" smtClean="0"/>
               <a:pPr/>
-              <a:t>16.12.2018</a:t>
+              <a:t>17.12.2018</a:t>
             </a:fld>
             <a:endParaRPr lang="cs-CZ"/>
           </a:p>
@@ -2708,7 +2708,7 @@
             <a:fld id="{8D149779-8706-44AB-BA40-0147129EF614}" type="datetimeFigureOut">
               <a:rPr lang="cs-CZ" smtClean="0"/>
               <a:pPr/>
-              <a:t>16.12.2018</a:t>
+              <a:t>17.12.2018</a:t>
             </a:fld>
             <a:endParaRPr lang="cs-CZ"/>
           </a:p>
@@ -3425,11 +3425,7 @@
             <a:pPr lvl="1"/>
             <a:r>
               <a:rPr lang="cs-CZ" sz="2000" dirty="0" smtClean="0"/>
-              <a:t>upravená (zjednodušená) syntaxe </a:t>
-            </a:r>
-            <a:r>
-              <a:rPr lang="cs-CZ" sz="2000" dirty="0" smtClean="0"/>
-              <a:t>ANTLR</a:t>
+              <a:t>upravená (zjednodušená) syntaxe ANTLR</a:t>
             </a:r>
           </a:p>
           <a:p>
@@ -3438,19 +3434,12 @@
               <a:rPr lang="cs-CZ" sz="1600" dirty="0" smtClean="0">
                 <a:hlinkClick r:id="rId2"/>
               </a:rPr>
-              <a:t>https://</a:t>
-            </a:r>
-            <a:r>
-              <a:rPr lang="cs-CZ" sz="1600" dirty="0" smtClean="0">
-                <a:hlinkClick r:id="rId2"/>
-              </a:rPr>
-              <a:t>github.com/antlr/grammars-v4/blob/master/apex/apex.g4</a:t>
+              <a:t>https://github.com/antlr/grammars-v4/blob/master/apex/apex.g4</a:t>
             </a:r>
             <a:r>
               <a:rPr lang="cs-CZ" sz="1600" dirty="0" smtClean="0"/>
               <a:t> (příklad ANTLR gramatiky)</a:t>
             </a:r>
-            <a:endParaRPr lang="cs-CZ" sz="1600" dirty="0" smtClean="0"/>
           </a:p>
           <a:p>
             <a:pPr lvl="1"/>
@@ -3624,7 +3613,11 @@
             <a:pPr lvl="1"/>
             <a:r>
               <a:rPr lang="cs-CZ" sz="2000" dirty="0" smtClean="0"/>
-              <a:t>terminály pak mezi dvojtečkou a středníkem obsahují buď </a:t>
+              <a:t>terminály </a:t>
+            </a:r>
+            <a:r>
+              <a:rPr lang="cs-CZ" sz="2000" dirty="0" smtClean="0"/>
+              <a:t>mezi dvojtečkou a středníkem obsahují buď </a:t>
             </a:r>
             <a:r>
               <a:rPr lang="cs-CZ" sz="2000" dirty="0" smtClean="0">
@@ -3733,8 +3726,56 @@
             </a:pPr>
             <a:r>
               <a:rPr lang="cs-CZ" sz="2400" dirty="0" smtClean="0"/>
-              <a:t>možnost změny vstupního řetězce a souboru s gramatikou za běhu programu</a:t>
-            </a:r>
+              <a:t>doladění aktuální </a:t>
+            </a:r>
+            <a:r>
+              <a:rPr lang="cs-CZ" sz="2400" dirty="0" smtClean="0"/>
+              <a:t>verze</a:t>
+            </a:r>
+          </a:p>
+          <a:p>
+            <a:pPr marL="857250" lvl="1" indent="-457200">
+              <a:buFont typeface="+mj-lt"/>
+              <a:buAutoNum type="arabicPeriod"/>
+            </a:pPr>
+            <a:r>
+              <a:rPr lang="cs-CZ" sz="2000" dirty="0" smtClean="0"/>
+              <a:t>? rozšíření možností gramatiky ?</a:t>
+            </a:r>
+            <a:endParaRPr lang="cs-CZ" sz="2000" dirty="0" smtClean="0"/>
+          </a:p>
+          <a:p>
+            <a:pPr marL="857250" lvl="1" indent="-457200">
+              <a:buFont typeface="+mj-lt"/>
+              <a:buAutoNum type="arabicPeriod"/>
+            </a:pPr>
+            <a:r>
+              <a:rPr lang="cs-CZ" sz="2000" dirty="0" smtClean="0"/>
+              <a:t>m</a:t>
+            </a:r>
+            <a:r>
+              <a:rPr lang="cs-CZ" sz="2000" dirty="0" smtClean="0"/>
+              <a:t>ožná úprava struktur </a:t>
+            </a:r>
+            <a:r>
+              <a:rPr lang="cs-CZ" sz="2000" smtClean="0"/>
+              <a:t>kvůli paměti a </a:t>
+            </a:r>
+            <a:r>
+              <a:rPr lang="cs-CZ" sz="2000" dirty="0" smtClean="0"/>
+              <a:t>rychlosti</a:t>
+            </a:r>
+          </a:p>
+          <a:p>
+            <a:pPr marL="857250" lvl="1" indent="-457200">
+              <a:buFont typeface="+mj-lt"/>
+              <a:buAutoNum type="arabicPeriod"/>
+            </a:pPr>
+            <a:r>
+              <a:rPr lang="cs-CZ" sz="2000" dirty="0" smtClean="0"/>
+              <a:t>testování</a:t>
+            </a:r>
+            <a:endParaRPr lang="cs-CZ" sz="2000" dirty="0" smtClean="0"/>
           </a:p>
           <a:p>
             <a:pPr marL="457200" indent="-457200">
@@ -3743,7 +3784,7 @@
             </a:pPr>
             <a:r>
               <a:rPr lang="cs-CZ" sz="2400" dirty="0" smtClean="0"/>
-              <a:t>funkcionalitu tlačítek pro ovládání vizualizace</a:t>
+              <a:t>LL(2), silná/slabá</a:t>
             </a:r>
           </a:p>
           <a:p>
@@ -3753,17 +3794,7 @@
             </a:pPr>
             <a:r>
               <a:rPr lang="cs-CZ" sz="2400" dirty="0" smtClean="0"/>
-              <a:t>derivační strom</a:t>
-            </a:r>
-          </a:p>
-          <a:p>
-            <a:pPr marL="457200" indent="-457200">
-              <a:buFont typeface="+mj-lt"/>
-              <a:buAutoNum type="arabicPeriod"/>
-            </a:pPr>
-            <a:r>
-              <a:rPr lang="cs-CZ" sz="2400" dirty="0" smtClean="0"/>
-              <a:t>funkce pro vytvoření vlastní rozkladové tabulky.</a:t>
+              <a:t>? derivační strom ?</a:t>
             </a:r>
             <a:endParaRPr lang="cs-CZ" sz="2400" dirty="0"/>
           </a:p>

</xml_diff>